<commit_message>
Doc & Dev (elaborated below)
- initial development for #articleabstract feature
- tracking last-seen tweet id
-readthedocs
</commit_message>
<xml_diff>
--- a/img/logos.pptx
+++ b/img/logos.pptx
@@ -4193,6 +4193,314 @@
           </a:p>
         </p:txBody>
       </p:sp>
+      <p:sp>
+        <p:nvSpPr>
+          <p:cNvPr id="3" name="Freeform: Shape 2">
+            <a:extLst>
+              <a:ext uri="{FF2B5EF4-FFF2-40B4-BE49-F238E27FC236}">
+                <a16:creationId xmlns:a16="http://schemas.microsoft.com/office/drawing/2014/main" id="{04536F6B-B844-42C5-83C6-3A13D0616AF0}"/>
+              </a:ext>
+            </a:extLst>
+          </p:cNvPr>
+          <p:cNvSpPr/>
+          <p:nvPr/>
+        </p:nvSpPr>
+        <p:spPr>
+          <a:xfrm rot="4912606">
+            <a:off x="-4490977" y="-1280331"/>
+            <a:ext cx="9346118" cy="10613697"/>
+          </a:xfrm>
+          <a:custGeom>
+            <a:avLst/>
+            <a:gdLst>
+              <a:gd name="connsiteX0" fmla="*/ 347363 w 5936417"/>
+              <a:gd name="connsiteY0" fmla="*/ 1702027 h 5037114"/>
+              <a:gd name="connsiteX1" fmla="*/ 3325455 w 5936417"/>
+              <a:gd name="connsiteY1" fmla="*/ 41007 h 5037114"/>
+              <a:gd name="connsiteX2" fmla="*/ 5875708 w 5936417"/>
+              <a:gd name="connsiteY2" fmla="*/ 905073 h 5037114"/>
+              <a:gd name="connsiteX3" fmla="*/ 682923 w 5936417"/>
+              <a:gd name="connsiteY3" fmla="*/ 5032456 h 5037114"/>
+              <a:gd name="connsiteX4" fmla="*/ 347363 w 5936417"/>
+              <a:gd name="connsiteY4" fmla="*/ 1702027 h 5037114"/>
+            </a:gdLst>
+            <a:ahLst/>
+            <a:cxnLst>
+              <a:cxn ang="0">
+                <a:pos x="connsiteX0" y="connsiteY0"/>
+              </a:cxn>
+              <a:cxn ang="0">
+                <a:pos x="connsiteX1" y="connsiteY1"/>
+              </a:cxn>
+              <a:cxn ang="0">
+                <a:pos x="connsiteX2" y="connsiteY2"/>
+              </a:cxn>
+              <a:cxn ang="0">
+                <a:pos x="connsiteX3" y="connsiteY3"/>
+              </a:cxn>
+              <a:cxn ang="0">
+                <a:pos x="connsiteX4" y="connsiteY4"/>
+              </a:cxn>
+            </a:cxnLst>
+            <a:rect l="l" t="t" r="r" b="b"/>
+            <a:pathLst>
+              <a:path w="5936417" h="5037114">
+                <a:moveTo>
+                  <a:pt x="347363" y="1702027"/>
+                </a:moveTo>
+                <a:cubicBezTo>
+                  <a:pt x="787785" y="870119"/>
+                  <a:pt x="2404064" y="173833"/>
+                  <a:pt x="3325455" y="41007"/>
+                </a:cubicBezTo>
+                <a:cubicBezTo>
+                  <a:pt x="4246846" y="-91819"/>
+                  <a:pt x="6316130" y="73165"/>
+                  <a:pt x="5875708" y="905073"/>
+                </a:cubicBezTo>
+                <a:cubicBezTo>
+                  <a:pt x="5435286" y="1736981"/>
+                  <a:pt x="1609906" y="4902427"/>
+                  <a:pt x="682923" y="5032456"/>
+                </a:cubicBezTo>
+                <a:cubicBezTo>
+                  <a:pt x="-244060" y="5162485"/>
+                  <a:pt x="-93059" y="2533935"/>
+                  <a:pt x="347363" y="1702027"/>
+                </a:cubicBezTo>
+                <a:close/>
+              </a:path>
+            </a:pathLst>
+          </a:custGeom>
+          <a:ln>
+            <a:noFill/>
+          </a:ln>
+        </p:spPr>
+        <p:style>
+          <a:lnRef idx="2">
+            <a:schemeClr val="accent1">
+              <a:shade val="50000"/>
+            </a:schemeClr>
+          </a:lnRef>
+          <a:fillRef idx="1">
+            <a:schemeClr val="accent1"/>
+          </a:fillRef>
+          <a:effectRef idx="0">
+            <a:schemeClr val="accent1"/>
+          </a:effectRef>
+          <a:fontRef idx="minor">
+            <a:schemeClr val="lt1"/>
+          </a:fontRef>
+        </p:style>
+        <p:txBody>
+          <a:bodyPr rtlCol="0" anchor="ctr"/>
+          <a:lstStyle/>
+          <a:p>
+            <a:pPr algn="ctr"/>
+            <a:endParaRPr lang="en-US"/>
+          </a:p>
+        </p:txBody>
+      </p:sp>
+      <p:sp>
+        <p:nvSpPr>
+          <p:cNvPr id="4" name="Freeform: Shape 3">
+            <a:extLst>
+              <a:ext uri="{FF2B5EF4-FFF2-40B4-BE49-F238E27FC236}">
+                <a16:creationId xmlns:a16="http://schemas.microsoft.com/office/drawing/2014/main" id="{CADCAC82-B87C-48A8-A2C0-B933E8524FE6}"/>
+              </a:ext>
+            </a:extLst>
+          </p:cNvPr>
+          <p:cNvSpPr/>
+          <p:nvPr/>
+        </p:nvSpPr>
+        <p:spPr>
+          <a:xfrm rot="6786993">
+            <a:off x="5141687" y="-4314554"/>
+            <a:ext cx="6493035" cy="11757417"/>
+          </a:xfrm>
+          <a:custGeom>
+            <a:avLst/>
+            <a:gdLst>
+              <a:gd name="connsiteX0" fmla="*/ 2378422 w 4848237"/>
+              <a:gd name="connsiteY0" fmla="*/ 445017 h 6919642"/>
+              <a:gd name="connsiteX1" fmla="*/ 2592067 w 4848237"/>
+              <a:gd name="connsiteY1" fmla="*/ 419379 h 6919642"/>
+              <a:gd name="connsiteX2" fmla="*/ 626534 w 4848237"/>
+              <a:gd name="connsiteY2" fmla="*/ 3436045 h 6919642"/>
+              <a:gd name="connsiteX3" fmla="*/ 28329 w 4848237"/>
+              <a:gd name="connsiteY3" fmla="*/ 4487177 h 6919642"/>
+              <a:gd name="connsiteX4" fmla="*/ 361615 w 4848237"/>
+              <a:gd name="connsiteY4" fmla="*/ 5196478 h 6919642"/>
+              <a:gd name="connsiteX5" fmla="*/ 2592067 w 4848237"/>
+              <a:gd name="connsiteY5" fmla="*/ 6085241 h 6919642"/>
+              <a:gd name="connsiteX6" fmla="*/ 4848157 w 4848237"/>
+              <a:gd name="connsiteY6" fmla="*/ 6563805 h 6919642"/>
+              <a:gd name="connsiteX7" fmla="*/ 2515155 w 4848237"/>
+              <a:gd name="connsiteY7" fmla="*/ 453562 h 6919642"/>
+              <a:gd name="connsiteX8" fmla="*/ 2378422 w 4848237"/>
+              <a:gd name="connsiteY8" fmla="*/ 445017 h 6919642"/>
+            </a:gdLst>
+            <a:ahLst/>
+            <a:cxnLst>
+              <a:cxn ang="0">
+                <a:pos x="connsiteX0" y="connsiteY0"/>
+              </a:cxn>
+              <a:cxn ang="0">
+                <a:pos x="connsiteX1" y="connsiteY1"/>
+              </a:cxn>
+              <a:cxn ang="0">
+                <a:pos x="connsiteX2" y="connsiteY2"/>
+              </a:cxn>
+              <a:cxn ang="0">
+                <a:pos x="connsiteX3" y="connsiteY3"/>
+              </a:cxn>
+              <a:cxn ang="0">
+                <a:pos x="connsiteX4" y="connsiteY4"/>
+              </a:cxn>
+              <a:cxn ang="0">
+                <a:pos x="connsiteX5" y="connsiteY5"/>
+              </a:cxn>
+              <a:cxn ang="0">
+                <a:pos x="connsiteX6" y="connsiteY6"/>
+              </a:cxn>
+              <a:cxn ang="0">
+                <a:pos x="connsiteX7" y="connsiteY7"/>
+              </a:cxn>
+              <a:cxn ang="0">
+                <a:pos x="connsiteX8" y="connsiteY8"/>
+              </a:cxn>
+            </a:cxnLst>
+            <a:rect l="l" t="t" r="r" b="b"/>
+            <a:pathLst>
+              <a:path w="4848237" h="6919642">
+                <a:moveTo>
+                  <a:pt x="2378422" y="445017"/>
+                </a:moveTo>
+                <a:cubicBezTo>
+                  <a:pt x="2391241" y="439320"/>
+                  <a:pt x="2884048" y="-79126"/>
+                  <a:pt x="2592067" y="419379"/>
+                </a:cubicBezTo>
+                <a:cubicBezTo>
+                  <a:pt x="2300086" y="917884"/>
+                  <a:pt x="1053824" y="2758079"/>
+                  <a:pt x="626534" y="3436045"/>
+                </a:cubicBezTo>
+                <a:cubicBezTo>
+                  <a:pt x="199244" y="4114011"/>
+                  <a:pt x="72482" y="4193772"/>
+                  <a:pt x="28329" y="4487177"/>
+                </a:cubicBezTo>
+                <a:cubicBezTo>
+                  <a:pt x="-15824" y="4780582"/>
+                  <a:pt x="-65675" y="4930134"/>
+                  <a:pt x="361615" y="5196478"/>
+                </a:cubicBezTo>
+                <a:cubicBezTo>
+                  <a:pt x="788905" y="5462822"/>
+                  <a:pt x="1844310" y="5857353"/>
+                  <a:pt x="2592067" y="6085241"/>
+                </a:cubicBezTo>
+                <a:cubicBezTo>
+                  <a:pt x="3339824" y="6313129"/>
+                  <a:pt x="4860976" y="7502418"/>
+                  <a:pt x="4848157" y="6563805"/>
+                </a:cubicBezTo>
+                <a:cubicBezTo>
+                  <a:pt x="4835338" y="5625192"/>
+                  <a:pt x="2926777" y="1471936"/>
+                  <a:pt x="2515155" y="453562"/>
+                </a:cubicBezTo>
+                <a:cubicBezTo>
+                  <a:pt x="2103533" y="-564812"/>
+                  <a:pt x="2365603" y="450714"/>
+                  <a:pt x="2378422" y="445017"/>
+                </a:cubicBezTo>
+                <a:close/>
+              </a:path>
+            </a:pathLst>
+          </a:custGeom>
+          <a:solidFill>
+            <a:srgbClr val="002060"/>
+          </a:solidFill>
+          <a:ln>
+            <a:noFill/>
+          </a:ln>
+        </p:spPr>
+        <p:style>
+          <a:lnRef idx="2">
+            <a:schemeClr val="accent1">
+              <a:shade val="50000"/>
+            </a:schemeClr>
+          </a:lnRef>
+          <a:fillRef idx="1">
+            <a:schemeClr val="accent1"/>
+          </a:fillRef>
+          <a:effectRef idx="0">
+            <a:schemeClr val="accent1"/>
+          </a:effectRef>
+          <a:fontRef idx="minor">
+            <a:schemeClr val="lt1"/>
+          </a:fontRef>
+        </p:style>
+        <p:txBody>
+          <a:bodyPr rtlCol="0" anchor="ctr"/>
+          <a:lstStyle/>
+          <a:p>
+            <a:pPr algn="ctr"/>
+            <a:endParaRPr lang="en-US"/>
+          </a:p>
+        </p:txBody>
+      </p:sp>
+      <p:sp>
+        <p:nvSpPr>
+          <p:cNvPr id="2" name="Rectangle 1">
+            <a:extLst>
+              <a:ext uri="{FF2B5EF4-FFF2-40B4-BE49-F238E27FC236}">
+                <a16:creationId xmlns:a16="http://schemas.microsoft.com/office/drawing/2014/main" id="{BED65AB2-AEE7-4243-A88A-042B8DDA2917}"/>
+              </a:ext>
+            </a:extLst>
+          </p:cNvPr>
+          <p:cNvSpPr/>
+          <p:nvPr/>
+        </p:nvSpPr>
+        <p:spPr>
+          <a:xfrm>
+            <a:off x="0" y="5021943"/>
+            <a:ext cx="2061029" cy="1836057"/>
+          </a:xfrm>
+          <a:prstGeom prst="rect">
+            <a:avLst/>
+          </a:prstGeom>
+          <a:ln>
+            <a:noFill/>
+          </a:ln>
+        </p:spPr>
+        <p:style>
+          <a:lnRef idx="2">
+            <a:schemeClr val="accent1">
+              <a:shade val="50000"/>
+            </a:schemeClr>
+          </a:lnRef>
+          <a:fillRef idx="1">
+            <a:schemeClr val="accent1"/>
+          </a:fillRef>
+          <a:effectRef idx="0">
+            <a:schemeClr val="accent1"/>
+          </a:effectRef>
+          <a:fontRef idx="minor">
+            <a:schemeClr val="lt1"/>
+          </a:fontRef>
+        </p:style>
+        <p:txBody>
+          <a:bodyPr rtlCol="0" anchor="ctr"/>
+          <a:lstStyle/>
+          <a:p>
+            <a:pPr algn="ctr"/>
+            <a:endParaRPr lang="en-US"/>
+          </a:p>
+        </p:txBody>
+      </p:sp>
     </p:spTree>
     <p:extLst>
       <p:ext uri="{BB962C8B-B14F-4D97-AF65-F5344CB8AC3E}">

</xml_diff>